<commit_message>
readme update and forward test image
</commit_message>
<xml_diff>
--- a/Project_3_Presentation.pptx
+++ b/Project_3_Presentation.pptx
@@ -243,7 +243,7 @@
           <a:p>
             <a:fld id="{CB1ACD7F-3F3F-489F-BF23-63CA95F3A7C0}" type="datetimeFigureOut">
               <a:rPr lang="en-US" smtClean="0"/>
-              <a:t>10/26/2021</a:t>
+              <a:t>10/27/2021</a:t>
             </a:fld>
             <a:endParaRPr lang="en-US"/>
           </a:p>
@@ -958,7 +958,7 @@
           <a:p>
             <a:fld id="{EFB8D598-913C-4247-97CD-5FBBEA2FCCF5}" type="datetimeFigureOut">
               <a:rPr lang="en-US" smtClean="0"/>
-              <a:t>10/26/2021</a:t>
+              <a:t>10/27/2021</a:t>
             </a:fld>
             <a:endParaRPr lang="en-US" dirty="0"/>
           </a:p>
@@ -1184,7 +1184,7 @@
           <a:p>
             <a:fld id="{EFB8D598-913C-4247-97CD-5FBBEA2FCCF5}" type="datetimeFigureOut">
               <a:rPr lang="en-US" smtClean="0"/>
-              <a:t>10/26/2021</a:t>
+              <a:t>10/27/2021</a:t>
             </a:fld>
             <a:endParaRPr lang="en-US" dirty="0"/>
           </a:p>
@@ -1359,7 +1359,7 @@
           <a:p>
             <a:fld id="{EFB8D598-913C-4247-97CD-5FBBEA2FCCF5}" type="datetimeFigureOut">
               <a:rPr lang="en-US" smtClean="0"/>
-              <a:t>10/26/2021</a:t>
+              <a:t>10/27/2021</a:t>
             </a:fld>
             <a:endParaRPr lang="en-US" dirty="0"/>
           </a:p>
@@ -1524,7 +1524,7 @@
           <a:p>
             <a:fld id="{EFB8D598-913C-4247-97CD-5FBBEA2FCCF5}" type="datetimeFigureOut">
               <a:rPr lang="en-US" smtClean="0"/>
-              <a:t>10/26/2021</a:t>
+              <a:t>10/27/2021</a:t>
             </a:fld>
             <a:endParaRPr lang="en-US" dirty="0"/>
           </a:p>
@@ -1768,7 +1768,7 @@
           <a:p>
             <a:fld id="{EFB8D598-913C-4247-97CD-5FBBEA2FCCF5}" type="datetimeFigureOut">
               <a:rPr lang="en-US" smtClean="0"/>
-              <a:t>10/26/2021</a:t>
+              <a:t>10/27/2021</a:t>
             </a:fld>
             <a:endParaRPr lang="en-US" dirty="0"/>
           </a:p>
@@ -2032,7 +2032,7 @@
           <a:p>
             <a:fld id="{EFB8D598-913C-4247-97CD-5FBBEA2FCCF5}" type="datetimeFigureOut">
               <a:rPr lang="en-US" smtClean="0"/>
-              <a:t>10/26/2021</a:t>
+              <a:t>10/27/2021</a:t>
             </a:fld>
             <a:endParaRPr lang="en-US" dirty="0"/>
           </a:p>
@@ -2406,7 +2406,7 @@
           <a:p>
             <a:fld id="{EFB8D598-913C-4247-97CD-5FBBEA2FCCF5}" type="datetimeFigureOut">
               <a:rPr lang="en-US" smtClean="0"/>
-              <a:t>10/26/2021</a:t>
+              <a:t>10/27/2021</a:t>
             </a:fld>
             <a:endParaRPr lang="en-US" dirty="0"/>
           </a:p>
@@ -2519,7 +2519,7 @@
           <a:p>
             <a:fld id="{EFB8D598-913C-4247-97CD-5FBBEA2FCCF5}" type="datetimeFigureOut">
               <a:rPr lang="en-US" smtClean="0"/>
-              <a:t>10/26/2021</a:t>
+              <a:t>10/27/2021</a:t>
             </a:fld>
             <a:endParaRPr lang="en-US" dirty="0"/>
           </a:p>
@@ -2609,7 +2609,7 @@
           <a:p>
             <a:fld id="{EFB8D598-913C-4247-97CD-5FBBEA2FCCF5}" type="datetimeFigureOut">
               <a:rPr lang="en-US" smtClean="0"/>
-              <a:t>10/26/2021</a:t>
+              <a:t>10/27/2021</a:t>
             </a:fld>
             <a:endParaRPr lang="en-US" dirty="0"/>
           </a:p>
@@ -2867,7 +2867,7 @@
           <a:p>
             <a:fld id="{EFB8D598-913C-4247-97CD-5FBBEA2FCCF5}" type="datetimeFigureOut">
               <a:rPr lang="en-US" smtClean="0"/>
-              <a:t>10/26/2021</a:t>
+              <a:t>10/27/2021</a:t>
             </a:fld>
             <a:endParaRPr lang="en-US" dirty="0"/>
           </a:p>
@@ -3131,7 +3131,7 @@
           <a:p>
             <a:fld id="{EFB8D598-913C-4247-97CD-5FBBEA2FCCF5}" type="datetimeFigureOut">
               <a:rPr lang="en-US" smtClean="0"/>
-              <a:t>10/26/2021</a:t>
+              <a:t>10/27/2021</a:t>
             </a:fld>
             <a:endParaRPr lang="en-US" dirty="0"/>
           </a:p>
@@ -3348,7 +3348,7 @@
           <a:p>
             <a:fld id="{EFB8D598-913C-4247-97CD-5FBBEA2FCCF5}" type="datetimeFigureOut">
               <a:rPr lang="en-US" smtClean="0"/>
-              <a:t>10/26/2021</a:t>
+              <a:t>10/27/2021</a:t>
             </a:fld>
             <a:endParaRPr lang="en-US" dirty="0"/>
           </a:p>
@@ -21531,7 +21531,7 @@
       </p:sp>
       <p:pic>
         <p:nvPicPr>
-          <p:cNvPr id="2" name="Picture 2"/>
+          <p:cNvPr id="1026" name="Picture 2"/>
           <p:cNvPicPr>
             <a:picLocks noChangeAspect="1" noChangeArrowheads="1"/>
           </p:cNvPicPr>
@@ -21552,8 +21552,8 @@
         </p:blipFill>
         <p:spPr bwMode="auto">
           <a:xfrm>
-            <a:off x="0" y="681039"/>
-            <a:ext cx="9216980" cy="4576762"/>
+            <a:off x="1" y="681039"/>
+            <a:ext cx="9144000" cy="4552276"/>
           </a:xfrm>
           <a:prstGeom prst="rect">
             <a:avLst/>

</xml_diff>